<commit_message>
added more content to ppt. added refs
</commit_message>
<xml_diff>
--- a/Blockchain-rjed_v2.pptx
+++ b/Blockchain-rjed_v2.pptx
@@ -35,10 +35,12 @@
     <p:sldId id="287" r:id="rId29"/>
     <p:sldId id="280" r:id="rId30"/>
     <p:sldId id="289" r:id="rId31"/>
-    <p:sldId id="281" r:id="rId32"/>
-    <p:sldId id="282" r:id="rId33"/>
-    <p:sldId id="283" r:id="rId34"/>
-    <p:sldId id="288" r:id="rId35"/>
+    <p:sldId id="290" r:id="rId32"/>
+    <p:sldId id="291" r:id="rId33"/>
+    <p:sldId id="281" r:id="rId34"/>
+    <p:sldId id="282" r:id="rId35"/>
+    <p:sldId id="283" r:id="rId36"/>
+    <p:sldId id="288" r:id="rId37"/>
   </p:sldIdLst>
   <p:sldSz cx="9144000" cy="6858000" type="screen4x3"/>
   <p:notesSz cx="6858000" cy="9144000"/>
@@ -321,7 +323,7 @@
           <a:p>
             <a:fld id="{6BFECD78-3C8E-49F2-8FAB-59489D168ABB}" type="datetimeFigureOut">
               <a:rPr lang="en-US" smtClean="0"/>
-              <a:t>16/09/17</a:t>
+              <a:t>17/09/17</a:t>
             </a:fld>
             <a:endParaRPr lang="en-US"/>
           </a:p>
@@ -491,7 +493,7 @@
           <a:p>
             <a:fld id="{6BFECD78-3C8E-49F2-8FAB-59489D168ABB}" type="datetimeFigureOut">
               <a:rPr lang="en-US" smtClean="0"/>
-              <a:t>16/09/17</a:t>
+              <a:t>17/09/17</a:t>
             </a:fld>
             <a:endParaRPr lang="en-US"/>
           </a:p>
@@ -671,7 +673,7 @@
           <a:p>
             <a:fld id="{6BFECD78-3C8E-49F2-8FAB-59489D168ABB}" type="datetimeFigureOut">
               <a:rPr lang="en-US" smtClean="0"/>
-              <a:t>16/09/17</a:t>
+              <a:t>17/09/17</a:t>
             </a:fld>
             <a:endParaRPr lang="en-US"/>
           </a:p>
@@ -841,7 +843,7 @@
           <a:p>
             <a:fld id="{6BFECD78-3C8E-49F2-8FAB-59489D168ABB}" type="datetimeFigureOut">
               <a:rPr lang="en-US" smtClean="0"/>
-              <a:t>16/09/17</a:t>
+              <a:t>17/09/17</a:t>
             </a:fld>
             <a:endParaRPr lang="en-US"/>
           </a:p>
@@ -1087,7 +1089,7 @@
           <a:p>
             <a:fld id="{6BFECD78-3C8E-49F2-8FAB-59489D168ABB}" type="datetimeFigureOut">
               <a:rPr lang="en-US" smtClean="0"/>
-              <a:t>16/09/17</a:t>
+              <a:t>17/09/17</a:t>
             </a:fld>
             <a:endParaRPr lang="en-US"/>
           </a:p>
@@ -1375,7 +1377,7 @@
           <a:p>
             <a:fld id="{6BFECD78-3C8E-49F2-8FAB-59489D168ABB}" type="datetimeFigureOut">
               <a:rPr lang="en-US" smtClean="0"/>
-              <a:t>16/09/17</a:t>
+              <a:t>17/09/17</a:t>
             </a:fld>
             <a:endParaRPr lang="en-US"/>
           </a:p>
@@ -1797,7 +1799,7 @@
           <a:p>
             <a:fld id="{6BFECD78-3C8E-49F2-8FAB-59489D168ABB}" type="datetimeFigureOut">
               <a:rPr lang="en-US" smtClean="0"/>
-              <a:t>16/09/17</a:t>
+              <a:t>17/09/17</a:t>
             </a:fld>
             <a:endParaRPr lang="en-US"/>
           </a:p>
@@ -1915,7 +1917,7 @@
           <a:p>
             <a:fld id="{6BFECD78-3C8E-49F2-8FAB-59489D168ABB}" type="datetimeFigureOut">
               <a:rPr lang="en-US" smtClean="0"/>
-              <a:t>16/09/17</a:t>
+              <a:t>17/09/17</a:t>
             </a:fld>
             <a:endParaRPr lang="en-US"/>
           </a:p>
@@ -2010,7 +2012,7 @@
           <a:p>
             <a:fld id="{6BFECD78-3C8E-49F2-8FAB-59489D168ABB}" type="datetimeFigureOut">
               <a:rPr lang="en-US" smtClean="0"/>
-              <a:t>16/09/17</a:t>
+              <a:t>17/09/17</a:t>
             </a:fld>
             <a:endParaRPr lang="en-US"/>
           </a:p>
@@ -2287,7 +2289,7 @@
           <a:p>
             <a:fld id="{6BFECD78-3C8E-49F2-8FAB-59489D168ABB}" type="datetimeFigureOut">
               <a:rPr lang="en-US" smtClean="0"/>
-              <a:t>16/09/17</a:t>
+              <a:t>17/09/17</a:t>
             </a:fld>
             <a:endParaRPr lang="en-US"/>
           </a:p>
@@ -2544,7 +2546,7 @@
           <a:p>
             <a:fld id="{6BFECD78-3C8E-49F2-8FAB-59489D168ABB}" type="datetimeFigureOut">
               <a:rPr lang="en-US" smtClean="0"/>
-              <a:t>16/09/17</a:t>
+              <a:t>17/09/17</a:t>
             </a:fld>
             <a:endParaRPr lang="en-US"/>
           </a:p>
@@ -2757,7 +2759,7 @@
           <a:p>
             <a:fld id="{6BFECD78-3C8E-49F2-8FAB-59489D168ABB}" type="datetimeFigureOut">
               <a:rPr lang="en-US" smtClean="0"/>
-              <a:t>16/09/17</a:t>
+              <a:t>17/09/17</a:t>
             </a:fld>
             <a:endParaRPr lang="en-US"/>
           </a:p>
@@ -3172,11 +3174,7 @@
           <a:p>
             <a:r>
               <a:rPr lang="en-US" dirty="0" smtClean="0"/>
-              <a:t>A technical </a:t>
-            </a:r>
-            <a:r>
-              <a:rPr lang="en-US" dirty="0" smtClean="0"/>
-              <a:t>primer</a:t>
+              <a:t>A technical primer</a:t>
             </a:r>
           </a:p>
           <a:p>
@@ -4227,15 +4225,7 @@
           <a:p>
             <a:r>
               <a:rPr lang="en-US" dirty="0" smtClean="0"/>
-              <a:t>What is the probability that the first 40 bits </a:t>
-            </a:r>
-            <a:r>
-              <a:rPr lang="en-US" dirty="0" smtClean="0"/>
-              <a:t>are</a:t>
-            </a:r>
-            <a:r>
-              <a:rPr lang="en-US" dirty="0" smtClean="0"/>
-              <a:t> zero for any HASH output?</a:t>
+              <a:t>What is the probability that the first 40 bits are zero for any HASH output?</a:t>
             </a:r>
           </a:p>
           <a:p>
@@ -4487,7 +4477,6 @@
               <a:rPr lang="en-US" dirty="0" smtClean="0"/>
               <a:t>Single bit change in any previous blocks will result in whole chain getting invalidated</a:t>
             </a:r>
-            <a:endParaRPr lang="en-US" dirty="0" smtClean="0"/>
           </a:p>
           <a:p>
             <a:r>
@@ -4602,7 +4591,7 @@
         <p:spPr/>
         <p:txBody>
           <a:bodyPr>
-            <a:normAutofit fontScale="92500" lnSpcReduction="10000"/>
+            <a:normAutofit fontScale="92500" lnSpcReduction="20000"/>
           </a:bodyPr>
           <a:lstStyle/>
           <a:p>
@@ -4625,6 +4614,14 @@
             <a:r>
               <a:rPr lang="en-US" dirty="0" err="1" smtClean="0"/>
               <a:t>coinbase</a:t>
+            </a:r>
+            <a:endParaRPr lang="en-US" dirty="0" smtClean="0"/>
+          </a:p>
+          <a:p>
+            <a:pPr lvl="1"/>
+            <a:r>
+              <a:rPr lang="en-US" dirty="0" smtClean="0"/>
+              <a:t>Incentive for validation</a:t>
             </a:r>
             <a:endParaRPr lang="en-US" dirty="0" smtClean="0"/>
           </a:p>
@@ -5090,11 +5087,7 @@
           <a:p>
             <a:r>
               <a:rPr lang="en-US" dirty="0" smtClean="0"/>
-              <a:t>How to decide that the branch is lon</a:t>
-            </a:r>
-            <a:r>
-              <a:rPr lang="en-US" dirty="0" smtClean="0"/>
-              <a:t>g enough?</a:t>
+              <a:t>How to decide that the branch is long enough?</a:t>
             </a:r>
             <a:endParaRPr lang="en-US" dirty="0"/>
           </a:p>
@@ -5170,15 +5163,7 @@
           <a:p>
             <a:r>
               <a:rPr lang="en-US" dirty="0" smtClean="0"/>
-              <a:t>Transaction </a:t>
-            </a:r>
-            <a:r>
-              <a:rPr lang="en-US" dirty="0" smtClean="0"/>
-              <a:t>CONFIRMATION </a:t>
-            </a:r>
-            <a:r>
-              <a:rPr lang="en-US" dirty="0" smtClean="0"/>
-              <a:t>time</a:t>
+              <a:t>Transaction CONFIRMATION time</a:t>
             </a:r>
           </a:p>
           <a:p>
@@ -5193,7 +5178,6 @@
               <a:rPr lang="en-US" dirty="0" smtClean="0"/>
               <a:t>Different apps may choose to have different confirmation times</a:t>
             </a:r>
-            <a:endParaRPr lang="en-US" dirty="0" smtClean="0"/>
           </a:p>
         </p:txBody>
       </p:sp>
@@ -5501,7 +5485,6 @@
               <a:rPr lang="en-US" dirty="0" smtClean="0"/>
               <a:t>How does it tackle double spending issue?</a:t>
             </a:r>
-            <a:endParaRPr lang="en-US" dirty="0" smtClean="0"/>
           </a:p>
           <a:p>
             <a:endParaRPr lang="en-US" dirty="0"/>
@@ -6188,7 +6171,7 @@
       </p:grpSpPr>
       <p:sp>
         <p:nvSpPr>
-          <p:cNvPr id="4" name="Title 3"/>
+          <p:cNvPr id="2" name="Title 1"/>
           <p:cNvSpPr>
             <a:spLocks noGrp="1"/>
           </p:cNvSpPr>
@@ -6202,8 +6185,12 @@
           <a:lstStyle/>
           <a:p>
             <a:r>
-              <a:rPr lang="en-US" dirty="0" smtClean="0"/>
-              <a:t>FAQs</a:t>
+              <a:rPr lang="en-US" dirty="0" err="1" smtClean="0"/>
+              <a:t>Blockchain</a:t>
+            </a:r>
+            <a:r>
+              <a:rPr lang="en-US" dirty="0" smtClean="0"/>
+              <a:t> Applications</a:t>
             </a:r>
             <a:endParaRPr lang="en-US" dirty="0"/>
           </a:p>
@@ -6211,44 +6198,86 @@
       </p:sp>
       <p:sp>
         <p:nvSpPr>
-          <p:cNvPr id="5" name="Text Placeholder 4"/>
-          <p:cNvSpPr>
-            <a:spLocks noGrp="1"/>
-          </p:cNvSpPr>
-          <p:nvPr>
-            <p:ph type="body" idx="1"/>
-          </p:nvPr>
-        </p:nvSpPr>
-        <p:spPr/>
-        <p:txBody>
-          <a:bodyPr/>
-          <a:lstStyle/>
-          <a:p>
-            <a:r>
-              <a:rPr lang="en-US" dirty="0" smtClean="0"/>
-              <a:t>Miscellaneous</a:t>
-            </a:r>
-            <a:endParaRPr lang="en-US" dirty="0"/>
+          <p:cNvPr id="3" name="Content Placeholder 2"/>
+          <p:cNvSpPr>
+            <a:spLocks noGrp="1"/>
+          </p:cNvSpPr>
+          <p:nvPr>
+            <p:ph idx="1"/>
+          </p:nvPr>
+        </p:nvSpPr>
+        <p:spPr/>
+        <p:txBody>
+          <a:bodyPr/>
+          <a:lstStyle/>
+          <a:p>
+            <a:r>
+              <a:rPr lang="en-US" dirty="0" err="1" smtClean="0"/>
+              <a:t>Bitcoin</a:t>
+            </a:r>
+            <a:r>
+              <a:rPr lang="en-US" dirty="0" smtClean="0"/>
+              <a:t> is just one application of </a:t>
+            </a:r>
+            <a:r>
+              <a:rPr lang="en-US" dirty="0" err="1" smtClean="0"/>
+              <a:t>Blockchain</a:t>
+            </a:r>
+            <a:endParaRPr lang="en-US" dirty="0" smtClean="0"/>
+          </a:p>
+          <a:p>
+            <a:r>
+              <a:rPr lang="en-US" dirty="0" smtClean="0"/>
+              <a:t>Consider other applications</a:t>
+            </a:r>
+          </a:p>
+          <a:p>
+            <a:pPr lvl="1"/>
+            <a:r>
+              <a:rPr lang="en-US" dirty="0" err="1" smtClean="0"/>
+              <a:t>Slock.it</a:t>
+            </a:r>
+            <a:endParaRPr lang="en-US" dirty="0" smtClean="0"/>
+          </a:p>
+          <a:p>
+            <a:pPr lvl="1"/>
+            <a:r>
+              <a:rPr lang="en-US" dirty="0" smtClean="0"/>
+              <a:t>International Trade</a:t>
+            </a:r>
+          </a:p>
+          <a:p>
+            <a:pPr lvl="1"/>
+            <a:r>
+              <a:rPr lang="en-US" dirty="0" smtClean="0"/>
+              <a:t>Freelancing at worldwide</a:t>
+            </a:r>
+          </a:p>
+          <a:p>
+            <a:pPr lvl="1"/>
+            <a:r>
+              <a:rPr lang="en-US" dirty="0" smtClean="0"/>
+              <a:t>Democratic: Content by the people, for the people</a:t>
+            </a:r>
+          </a:p>
+          <a:p>
+            <a:r>
+              <a:rPr lang="en-US" dirty="0" smtClean="0"/>
+              <a:t>What am I working towards?</a:t>
+            </a:r>
           </a:p>
         </p:txBody>
       </p:sp>
     </p:spTree>
     <p:extLst>
       <p:ext uri="{BB962C8B-B14F-4D97-AF65-F5344CB8AC3E}">
-        <p14:creationId xmlns:p14="http://schemas.microsoft.com/office/powerpoint/2010/main" val="3915952101"/>
+        <p14:creationId xmlns:p14="http://schemas.microsoft.com/office/powerpoint/2010/main" val="3926512850"/>
       </p:ext>
     </p:extLst>
   </p:cSld>
   <p:clrMapOvr>
     <a:masterClrMapping/>
   </p:clrMapOvr>
-  <p:timing>
-    <p:tnLst>
-      <p:par>
-        <p:cTn xmlns:p14="http://schemas.microsoft.com/office/powerpoint/2010/main" id="1" dur="indefinite" restart="never" nodeType="tmRoot"/>
-      </p:par>
-    </p:tnLst>
-  </p:timing>
 </p:sld>
 </file>
 
@@ -6285,185 +6314,161 @@
           <a:lstStyle/>
           <a:p>
             <a:r>
-              <a:rPr lang="en-US" dirty="0" smtClean="0"/>
-              <a:t>FAQs</a:t>
-            </a:r>
-            <a:endParaRPr lang="en-US" dirty="0"/>
-          </a:p>
-        </p:txBody>
-      </p:sp>
-      <p:sp>
-        <p:nvSpPr>
-          <p:cNvPr id="3" name="Content Placeholder 2"/>
-          <p:cNvSpPr>
-            <a:spLocks noGrp="1"/>
-          </p:cNvSpPr>
-          <p:nvPr>
-            <p:ph idx="1"/>
-          </p:nvPr>
-        </p:nvSpPr>
-        <p:spPr/>
-        <p:txBody>
-          <a:bodyPr>
-            <a:normAutofit fontScale="92500" lnSpcReduction="10000"/>
-          </a:bodyPr>
-          <a:lstStyle/>
-          <a:p>
-            <a:r>
-              <a:rPr lang="en-US" dirty="0" smtClean="0"/>
-              <a:t>What is public </a:t>
-            </a:r>
-            <a:r>
-              <a:rPr lang="en-US" dirty="0" err="1" smtClean="0"/>
-              <a:t>vs</a:t>
-            </a:r>
-            <a:r>
-              <a:rPr lang="en-US" dirty="0"/>
-              <a:t> </a:t>
-            </a:r>
-            <a:r>
-              <a:rPr lang="en-US" dirty="0" smtClean="0"/>
-              <a:t>private </a:t>
-            </a:r>
-            <a:r>
-              <a:rPr lang="en-US" dirty="0" err="1" smtClean="0"/>
-              <a:t>blockchain</a:t>
-            </a:r>
-            <a:r>
-              <a:rPr lang="en-US" dirty="0" smtClean="0"/>
-              <a:t>?</a:t>
-            </a:r>
-          </a:p>
-          <a:p>
-            <a:r>
-              <a:rPr lang="en-US" dirty="0" smtClean="0"/>
-              <a:t>What is </a:t>
-            </a:r>
-            <a:r>
-              <a:rPr lang="en-US" dirty="0" err="1" smtClean="0"/>
-              <a:t>Bitcoin</a:t>
-            </a:r>
-            <a:r>
-              <a:rPr lang="en-US" dirty="0" smtClean="0"/>
-              <a:t>-Cash fork?</a:t>
-            </a:r>
-          </a:p>
-          <a:p>
-            <a:r>
-              <a:rPr lang="en-US" dirty="0" smtClean="0"/>
-              <a:t>What is </a:t>
-            </a:r>
-            <a:r>
-              <a:rPr lang="en-US" dirty="0" err="1" smtClean="0"/>
-              <a:t>HyperLedger</a:t>
-            </a:r>
-            <a:r>
-              <a:rPr lang="en-US" dirty="0" smtClean="0"/>
-              <a:t>?</a:t>
-            </a:r>
-          </a:p>
-          <a:p>
-            <a:r>
-              <a:rPr lang="en-US" dirty="0" smtClean="0"/>
-              <a:t>What are ICOs?</a:t>
-            </a:r>
-          </a:p>
-          <a:p>
-            <a:r>
-              <a:rPr lang="en-US" dirty="0" smtClean="0"/>
-              <a:t>What is </a:t>
-            </a:r>
-            <a:r>
               <a:rPr lang="en-US" dirty="0" err="1" smtClean="0"/>
               <a:t>Blockchain</a:t>
             </a:r>
             <a:r>
               <a:rPr lang="en-US" dirty="0" smtClean="0"/>
-              <a:t>-As-A-Service (</a:t>
+              <a:t> Revamped</a:t>
+            </a:r>
+            <a:endParaRPr lang="en-US" dirty="0"/>
+          </a:p>
+        </p:txBody>
+      </p:sp>
+      <p:sp>
+        <p:nvSpPr>
+          <p:cNvPr id="3" name="Content Placeholder 2"/>
+          <p:cNvSpPr>
+            <a:spLocks noGrp="1"/>
+          </p:cNvSpPr>
+          <p:nvPr>
+            <p:ph idx="1"/>
+          </p:nvPr>
+        </p:nvSpPr>
+        <p:spPr/>
+        <p:txBody>
+          <a:bodyPr>
+            <a:normAutofit/>
+          </a:bodyPr>
+          <a:lstStyle/>
+          <a:p>
+            <a:r>
+              <a:rPr lang="en-US" dirty="0" smtClean="0"/>
+              <a:t>What is </a:t>
             </a:r>
             <a:r>
               <a:rPr lang="en-US" dirty="0" err="1" smtClean="0"/>
-              <a:t>BaaS</a:t>
-            </a:r>
-            <a:r>
-              <a:rPr lang="en-US" dirty="0" smtClean="0"/>
-              <a:t>)?</a:t>
-            </a:r>
-          </a:p>
-          <a:p>
-            <a:r>
-              <a:rPr lang="en-US" dirty="0" smtClean="0"/>
-              <a:t>What is </a:t>
+              <a:t>Blockchain</a:t>
+            </a:r>
+            <a:r>
+              <a:rPr lang="en-US" dirty="0" smtClean="0"/>
+              <a:t> 1.0/2.0/3.0?</a:t>
+            </a:r>
+          </a:p>
+          <a:p>
+            <a:r>
+              <a:rPr lang="en-US" dirty="0" smtClean="0"/>
+              <a:t>1.0 </a:t>
+            </a:r>
+            <a:r>
+              <a:rPr lang="mr-IN" dirty="0" smtClean="0"/>
+              <a:t>–</a:t>
+            </a:r>
+            <a:r>
+              <a:rPr lang="en-US" dirty="0" smtClean="0"/>
+              <a:t> Turing incomplete </a:t>
+            </a:r>
+            <a:r>
+              <a:rPr lang="mr-IN" dirty="0" smtClean="0"/>
+              <a:t>–</a:t>
+            </a:r>
+            <a:r>
+              <a:rPr lang="en-US" dirty="0" smtClean="0"/>
+              <a:t> Public </a:t>
+            </a:r>
+            <a:r>
+              <a:rPr lang="en-US" dirty="0" err="1" smtClean="0"/>
+              <a:t>Blockchain</a:t>
+            </a:r>
+            <a:endParaRPr lang="en-US" dirty="0" smtClean="0"/>
+          </a:p>
+          <a:p>
+            <a:r>
+              <a:rPr lang="en-US" dirty="0" smtClean="0"/>
+              <a:t>2.0 </a:t>
+            </a:r>
+            <a:r>
+              <a:rPr lang="mr-IN" dirty="0" smtClean="0"/>
+              <a:t>–</a:t>
+            </a:r>
+            <a:r>
+              <a:rPr lang="en-US" dirty="0" smtClean="0"/>
+              <a:t> Turing Complete </a:t>
+            </a:r>
+            <a:r>
+              <a:rPr lang="mr-IN" dirty="0" smtClean="0"/>
+              <a:t>–</a:t>
+            </a:r>
+            <a:r>
+              <a:rPr lang="en-US" dirty="0" smtClean="0"/>
+              <a:t> </a:t>
             </a:r>
             <a:r>
               <a:rPr lang="en-US" dirty="0" err="1" smtClean="0"/>
               <a:t>Ethereum</a:t>
             </a:r>
-            <a:r>
-              <a:rPr lang="en-US" dirty="0"/>
-              <a:t> </a:t>
-            </a:r>
-            <a:r>
-              <a:rPr lang="en-US" dirty="0" smtClean="0"/>
-              <a:t>and how is it different from </a:t>
+            <a:endParaRPr lang="en-US" dirty="0" smtClean="0"/>
+          </a:p>
+          <a:p>
+            <a:r>
+              <a:rPr lang="en-US" dirty="0" smtClean="0"/>
+              <a:t>3.0 </a:t>
+            </a:r>
+            <a:r>
+              <a:rPr lang="mr-IN" dirty="0" smtClean="0"/>
+              <a:t>–</a:t>
+            </a:r>
+            <a:r>
+              <a:rPr lang="en-US" dirty="0" smtClean="0"/>
+              <a:t> External Data Oracles </a:t>
+            </a:r>
+            <a:r>
+              <a:rPr lang="mr-IN" dirty="0" smtClean="0"/>
+              <a:t>–</a:t>
+            </a:r>
+            <a:r>
+              <a:rPr lang="en-US" dirty="0" smtClean="0"/>
+              <a:t> MS </a:t>
             </a:r>
             <a:r>
               <a:rPr lang="en-US" dirty="0" err="1" smtClean="0"/>
-              <a:t>Bitcoin</a:t>
-            </a:r>
-            <a:r>
-              <a:rPr lang="en-US" dirty="0" smtClean="0"/>
-              <a:t> network?</a:t>
-            </a:r>
-          </a:p>
-          <a:p>
-            <a:r>
-              <a:rPr lang="en-US" dirty="0" smtClean="0"/>
-              <a:t>Why does </a:t>
-            </a:r>
-            <a:r>
-              <a:rPr lang="en-US" dirty="0" err="1" smtClean="0"/>
-              <a:t>IoT</a:t>
-            </a:r>
-            <a:r>
-              <a:rPr lang="en-US" dirty="0" smtClean="0"/>
-              <a:t> and </a:t>
-            </a:r>
-            <a:r>
-              <a:rPr lang="en-US" dirty="0" err="1" smtClean="0"/>
-              <a:t>blockchain</a:t>
-            </a:r>
-            <a:r>
-              <a:rPr lang="en-US" dirty="0" smtClean="0"/>
-              <a:t> goes hand in hand?</a:t>
-            </a:r>
-          </a:p>
-          <a:p>
-            <a:r>
-              <a:rPr lang="en-US" dirty="0" smtClean="0"/>
-              <a:t>What is Proof-Of-Stake?</a:t>
-            </a:r>
-            <a:endParaRPr lang="en-US" dirty="0"/>
+              <a:t>Bletchely</a:t>
+            </a:r>
+            <a:endParaRPr lang="en-US" dirty="0" smtClean="0"/>
+          </a:p>
+          <a:p>
+            <a:pPr lvl="1"/>
+            <a:r>
+              <a:rPr lang="en-US" dirty="0" smtClean="0"/>
+              <a:t>Unfair to call versions</a:t>
+            </a:r>
+          </a:p>
+          <a:p>
+            <a:pPr lvl="1"/>
+            <a:r>
+              <a:rPr lang="en-US" dirty="0" smtClean="0"/>
+              <a:t>1.0 is still applicable to lot of problem statements without adding the complexity of 2.0/3.0</a:t>
+            </a:r>
+          </a:p>
+          <a:p>
+            <a:pPr lvl="2"/>
+            <a:r>
+              <a:rPr lang="en-US" dirty="0" smtClean="0"/>
+              <a:t>Note Complexity adds software issues</a:t>
+            </a:r>
           </a:p>
         </p:txBody>
       </p:sp>
     </p:spTree>
     <p:extLst>
       <p:ext uri="{BB962C8B-B14F-4D97-AF65-F5344CB8AC3E}">
-        <p14:creationId xmlns:p14="http://schemas.microsoft.com/office/powerpoint/2010/main" val="3915952101"/>
+        <p14:creationId xmlns:p14="http://schemas.microsoft.com/office/powerpoint/2010/main" val="298608600"/>
       </p:ext>
     </p:extLst>
   </p:cSld>
   <p:clrMapOvr>
     <a:masterClrMapping/>
   </p:clrMapOvr>
-  <p:timing>
-    <p:tnLst>
-      <p:par>
-        <p:cTn xmlns:p14="http://schemas.microsoft.com/office/powerpoint/2010/main" id="1" dur="indefinite" restart="never" nodeType="tmRoot"/>
-      </p:par>
-    </p:tnLst>
-  </p:timing>
 </p:sld>
 </file>
 
@@ -6486,7 +6491,7 @@
       </p:grpSpPr>
       <p:sp>
         <p:nvSpPr>
-          <p:cNvPr id="2" name="Title 1"/>
+          <p:cNvPr id="4" name="Title 3"/>
           <p:cNvSpPr>
             <a:spLocks noGrp="1"/>
           </p:cNvSpPr>
@@ -6509,94 +6514,22 @@
       </p:sp>
       <p:sp>
         <p:nvSpPr>
-          <p:cNvPr id="3" name="Content Placeholder 2"/>
-          <p:cNvSpPr>
-            <a:spLocks noGrp="1"/>
-          </p:cNvSpPr>
-          <p:nvPr>
-            <p:ph idx="1"/>
-          </p:nvPr>
-        </p:nvSpPr>
-        <p:spPr/>
-        <p:txBody>
-          <a:bodyPr>
-            <a:normAutofit fontScale="92500" lnSpcReduction="20000"/>
-          </a:bodyPr>
-          <a:lstStyle/>
-          <a:p>
-            <a:r>
-              <a:rPr lang="en-US" dirty="0" smtClean="0"/>
-              <a:t>What is Microsoft </a:t>
-            </a:r>
-            <a:r>
-              <a:rPr lang="en-US" dirty="0" err="1" smtClean="0"/>
-              <a:t>Bletchely</a:t>
-            </a:r>
-            <a:r>
-              <a:rPr lang="en-US" dirty="0" smtClean="0"/>
-              <a:t> Project?</a:t>
-            </a:r>
-          </a:p>
-          <a:p>
-            <a:pPr lvl="1"/>
-            <a:r>
-              <a:rPr lang="en-US" dirty="0" smtClean="0"/>
-              <a:t>Microsoft’s strategy for </a:t>
-            </a:r>
-            <a:r>
-              <a:rPr lang="en-US" dirty="0" err="1" smtClean="0"/>
-              <a:t>BaaS</a:t>
-            </a:r>
-            <a:endParaRPr lang="en-US" dirty="0" smtClean="0"/>
-          </a:p>
-          <a:p>
-            <a:r>
-              <a:rPr lang="en-US" dirty="0" smtClean="0"/>
-              <a:t>What are governments doing about it?</a:t>
-            </a:r>
-          </a:p>
-          <a:p>
-            <a:pPr lvl="1"/>
-            <a:r>
-              <a:rPr lang="en-US" dirty="0" smtClean="0"/>
-              <a:t>Taxation rules in India?</a:t>
-            </a:r>
-          </a:p>
-          <a:p>
-            <a:pPr lvl="1"/>
-            <a:r>
-              <a:rPr lang="en-US" dirty="0" smtClean="0"/>
-              <a:t>ICO regulations?</a:t>
-            </a:r>
-          </a:p>
-          <a:p>
-            <a:r>
-              <a:rPr lang="en-US" dirty="0" smtClean="0"/>
-              <a:t>What are DAOs (Decentralized Autonomous Organizations)?</a:t>
-            </a:r>
-          </a:p>
-          <a:p>
-            <a:r>
-              <a:rPr lang="en-US" dirty="0" smtClean="0"/>
-              <a:t>Was there a fraud in such systems?</a:t>
-            </a:r>
-          </a:p>
-          <a:p>
-            <a:pPr lvl="1"/>
-            <a:r>
-              <a:rPr lang="en-US" dirty="0" smtClean="0"/>
-              <a:t>What steps were taken for recovery?</a:t>
-            </a:r>
-          </a:p>
-          <a:p>
-            <a:pPr lvl="1"/>
-            <a:r>
-              <a:rPr lang="en-US" dirty="0" smtClean="0"/>
-              <a:t>50mn DAO virtual </a:t>
-            </a:r>
-            <a:r>
-              <a:rPr lang="en-US" smtClean="0"/>
-              <a:t>currency siphoned off.</a:t>
+          <p:cNvPr id="5" name="Text Placeholder 4"/>
+          <p:cNvSpPr>
+            <a:spLocks noGrp="1"/>
+          </p:cNvSpPr>
+          <p:nvPr>
+            <p:ph type="body" idx="1"/>
+          </p:nvPr>
+        </p:nvSpPr>
+        <p:spPr/>
+        <p:txBody>
+          <a:bodyPr/>
+          <a:lstStyle/>
+          <a:p>
+            <a:r>
+              <a:rPr lang="en-US" dirty="0" smtClean="0"/>
+              <a:t>Miscellaneous</a:t>
             </a:r>
             <a:endParaRPr lang="en-US" dirty="0"/>
           </a:p>
@@ -6623,6 +6556,403 @@
 </file>
 
 <file path=ppt/slides/slide34.xml><?xml version="1.0" encoding="utf-8"?>
+<p:sld xmlns:a="http://schemas.openxmlformats.org/drawingml/2006/main" xmlns:r="http://schemas.openxmlformats.org/officeDocument/2006/relationships" xmlns:p="http://schemas.openxmlformats.org/presentationml/2006/main">
+  <p:cSld>
+    <p:spTree>
+      <p:nvGrpSpPr>
+        <p:cNvPr id="1" name=""/>
+        <p:cNvGrpSpPr/>
+        <p:nvPr/>
+      </p:nvGrpSpPr>
+      <p:grpSpPr>
+        <a:xfrm>
+          <a:off x="0" y="0"/>
+          <a:ext cx="0" cy="0"/>
+          <a:chOff x="0" y="0"/>
+          <a:chExt cx="0" cy="0"/>
+        </a:xfrm>
+      </p:grpSpPr>
+      <p:sp>
+        <p:nvSpPr>
+          <p:cNvPr id="2" name="Title 1"/>
+          <p:cNvSpPr>
+            <a:spLocks noGrp="1"/>
+          </p:cNvSpPr>
+          <p:nvPr>
+            <p:ph type="title"/>
+          </p:nvPr>
+        </p:nvSpPr>
+        <p:spPr/>
+        <p:txBody>
+          <a:bodyPr/>
+          <a:lstStyle/>
+          <a:p>
+            <a:r>
+              <a:rPr lang="en-US" dirty="0" smtClean="0"/>
+              <a:t>FAQs</a:t>
+            </a:r>
+            <a:endParaRPr lang="en-US" dirty="0"/>
+          </a:p>
+        </p:txBody>
+      </p:sp>
+      <p:sp>
+        <p:nvSpPr>
+          <p:cNvPr id="3" name="Content Placeholder 2"/>
+          <p:cNvSpPr>
+            <a:spLocks noGrp="1"/>
+          </p:cNvSpPr>
+          <p:nvPr>
+            <p:ph idx="1"/>
+          </p:nvPr>
+        </p:nvSpPr>
+        <p:spPr/>
+        <p:txBody>
+          <a:bodyPr>
+            <a:normAutofit fontScale="92500" lnSpcReduction="20000"/>
+          </a:bodyPr>
+          <a:lstStyle/>
+          <a:p>
+            <a:r>
+              <a:rPr lang="en-US" dirty="0" smtClean="0"/>
+              <a:t>What is public </a:t>
+            </a:r>
+            <a:r>
+              <a:rPr lang="en-US" dirty="0" err="1" smtClean="0"/>
+              <a:t>vs</a:t>
+            </a:r>
+            <a:r>
+              <a:rPr lang="en-US" dirty="0"/>
+              <a:t> </a:t>
+            </a:r>
+            <a:r>
+              <a:rPr lang="en-US" dirty="0" smtClean="0"/>
+              <a:t>private </a:t>
+            </a:r>
+            <a:r>
+              <a:rPr lang="en-US" dirty="0" err="1" smtClean="0"/>
+              <a:t>blockchain</a:t>
+            </a:r>
+            <a:r>
+              <a:rPr lang="en-US" dirty="0" smtClean="0"/>
+              <a:t>?</a:t>
+            </a:r>
+          </a:p>
+          <a:p>
+            <a:r>
+              <a:rPr lang="en-US" dirty="0" smtClean="0"/>
+              <a:t>What is </a:t>
+            </a:r>
+            <a:r>
+              <a:rPr lang="en-US" dirty="0" err="1" smtClean="0"/>
+              <a:t>Bitcoin</a:t>
+            </a:r>
+            <a:r>
+              <a:rPr lang="en-US" dirty="0" smtClean="0"/>
+              <a:t>-Cash fork?</a:t>
+            </a:r>
+          </a:p>
+          <a:p>
+            <a:r>
+              <a:rPr lang="en-US" dirty="0" smtClean="0"/>
+              <a:t>What is </a:t>
+            </a:r>
+            <a:r>
+              <a:rPr lang="en-US" dirty="0" err="1" smtClean="0"/>
+              <a:t>HyperLedger</a:t>
+            </a:r>
+            <a:r>
+              <a:rPr lang="en-US" dirty="0" smtClean="0"/>
+              <a:t>?</a:t>
+            </a:r>
+          </a:p>
+          <a:p>
+            <a:r>
+              <a:rPr lang="en-US" dirty="0" smtClean="0"/>
+              <a:t>What are ICOs?</a:t>
+            </a:r>
+          </a:p>
+          <a:p>
+            <a:r>
+              <a:rPr lang="en-US" dirty="0" smtClean="0"/>
+              <a:t>What is </a:t>
+            </a:r>
+            <a:r>
+              <a:rPr lang="en-US" dirty="0" err="1" smtClean="0"/>
+              <a:t>Blockchain</a:t>
+            </a:r>
+            <a:r>
+              <a:rPr lang="en-US" dirty="0" smtClean="0"/>
+              <a:t>-As-A-Service (</a:t>
+            </a:r>
+            <a:r>
+              <a:rPr lang="en-US" dirty="0" err="1" smtClean="0"/>
+              <a:t>BaaS</a:t>
+            </a:r>
+            <a:r>
+              <a:rPr lang="en-US" dirty="0" smtClean="0"/>
+              <a:t>)?</a:t>
+            </a:r>
+          </a:p>
+          <a:p>
+            <a:r>
+              <a:rPr lang="en-US" dirty="0" smtClean="0"/>
+              <a:t>What is </a:t>
+            </a:r>
+            <a:r>
+              <a:rPr lang="en-US" dirty="0" err="1" smtClean="0"/>
+              <a:t>Ethereum</a:t>
+            </a:r>
+            <a:r>
+              <a:rPr lang="en-US" dirty="0"/>
+              <a:t> </a:t>
+            </a:r>
+            <a:r>
+              <a:rPr lang="en-US" dirty="0" smtClean="0"/>
+              <a:t>and how is it different from </a:t>
+            </a:r>
+            <a:r>
+              <a:rPr lang="en-US" dirty="0" err="1" smtClean="0"/>
+              <a:t>Bitcoin</a:t>
+            </a:r>
+            <a:r>
+              <a:rPr lang="en-US" dirty="0" smtClean="0"/>
+              <a:t> network</a:t>
+            </a:r>
+            <a:r>
+              <a:rPr lang="en-US" dirty="0" smtClean="0"/>
+              <a:t>?</a:t>
+            </a:r>
+          </a:p>
+          <a:p>
+            <a:pPr lvl="1"/>
+            <a:r>
+              <a:rPr lang="en-US" dirty="0" smtClean="0"/>
+              <a:t>What are Smart Contracts?</a:t>
+            </a:r>
+            <a:endParaRPr lang="en-US" dirty="0" smtClean="0"/>
+          </a:p>
+          <a:p>
+            <a:r>
+              <a:rPr lang="en-US" dirty="0" smtClean="0"/>
+              <a:t>Why does </a:t>
+            </a:r>
+            <a:r>
+              <a:rPr lang="en-US" dirty="0" err="1" smtClean="0"/>
+              <a:t>IoT</a:t>
+            </a:r>
+            <a:r>
+              <a:rPr lang="en-US" dirty="0" smtClean="0"/>
+              <a:t> and </a:t>
+            </a:r>
+            <a:r>
+              <a:rPr lang="en-US" dirty="0" err="1" smtClean="0"/>
+              <a:t>blockchain</a:t>
+            </a:r>
+            <a:r>
+              <a:rPr lang="en-US" dirty="0" smtClean="0"/>
+              <a:t> goes hand in hand?</a:t>
+            </a:r>
+          </a:p>
+          <a:p>
+            <a:r>
+              <a:rPr lang="en-US" dirty="0" smtClean="0"/>
+              <a:t>What is Proof-Of-Stake?</a:t>
+            </a:r>
+            <a:endParaRPr lang="en-US" dirty="0"/>
+          </a:p>
+        </p:txBody>
+      </p:sp>
+    </p:spTree>
+    <p:extLst>
+      <p:ext uri="{BB962C8B-B14F-4D97-AF65-F5344CB8AC3E}">
+        <p14:creationId xmlns:p14="http://schemas.microsoft.com/office/powerpoint/2010/main" val="3915952101"/>
+      </p:ext>
+    </p:extLst>
+  </p:cSld>
+  <p:clrMapOvr>
+    <a:masterClrMapping/>
+  </p:clrMapOvr>
+  <p:timing>
+    <p:tnLst>
+      <p:par>
+        <p:cTn xmlns:p14="http://schemas.microsoft.com/office/powerpoint/2010/main" id="1" dur="indefinite" restart="never" nodeType="tmRoot"/>
+      </p:par>
+    </p:tnLst>
+  </p:timing>
+</p:sld>
+</file>
+
+<file path=ppt/slides/slide35.xml><?xml version="1.0" encoding="utf-8"?>
+<p:sld xmlns:a="http://schemas.openxmlformats.org/drawingml/2006/main" xmlns:r="http://schemas.openxmlformats.org/officeDocument/2006/relationships" xmlns:p="http://schemas.openxmlformats.org/presentationml/2006/main">
+  <p:cSld>
+    <p:spTree>
+      <p:nvGrpSpPr>
+        <p:cNvPr id="1" name=""/>
+        <p:cNvGrpSpPr/>
+        <p:nvPr/>
+      </p:nvGrpSpPr>
+      <p:grpSpPr>
+        <a:xfrm>
+          <a:off x="0" y="0"/>
+          <a:ext cx="0" cy="0"/>
+          <a:chOff x="0" y="0"/>
+          <a:chExt cx="0" cy="0"/>
+        </a:xfrm>
+      </p:grpSpPr>
+      <p:sp>
+        <p:nvSpPr>
+          <p:cNvPr id="2" name="Title 1"/>
+          <p:cNvSpPr>
+            <a:spLocks noGrp="1"/>
+          </p:cNvSpPr>
+          <p:nvPr>
+            <p:ph type="title"/>
+          </p:nvPr>
+        </p:nvSpPr>
+        <p:spPr/>
+        <p:txBody>
+          <a:bodyPr/>
+          <a:lstStyle/>
+          <a:p>
+            <a:r>
+              <a:rPr lang="en-US" dirty="0" smtClean="0"/>
+              <a:t>FAQs</a:t>
+            </a:r>
+            <a:endParaRPr lang="en-US" dirty="0"/>
+          </a:p>
+        </p:txBody>
+      </p:sp>
+      <p:sp>
+        <p:nvSpPr>
+          <p:cNvPr id="3" name="Content Placeholder 2"/>
+          <p:cNvSpPr>
+            <a:spLocks noGrp="1"/>
+          </p:cNvSpPr>
+          <p:nvPr>
+            <p:ph idx="1"/>
+          </p:nvPr>
+        </p:nvSpPr>
+        <p:spPr/>
+        <p:txBody>
+          <a:bodyPr>
+            <a:normAutofit fontScale="85000" lnSpcReduction="20000"/>
+          </a:bodyPr>
+          <a:lstStyle/>
+          <a:p>
+            <a:r>
+              <a:rPr lang="en-US" dirty="0" smtClean="0"/>
+              <a:t>What is Microsoft </a:t>
+            </a:r>
+            <a:r>
+              <a:rPr lang="en-US" dirty="0" err="1" smtClean="0"/>
+              <a:t>Bletchely</a:t>
+            </a:r>
+            <a:r>
+              <a:rPr lang="en-US" dirty="0" smtClean="0"/>
+              <a:t> Project?</a:t>
+            </a:r>
+          </a:p>
+          <a:p>
+            <a:pPr lvl="1"/>
+            <a:r>
+              <a:rPr lang="en-US" dirty="0" smtClean="0"/>
+              <a:t>Microsoft’s strategy for </a:t>
+            </a:r>
+            <a:r>
+              <a:rPr lang="en-US" dirty="0" err="1" smtClean="0"/>
+              <a:t>BaaS</a:t>
+            </a:r>
+            <a:endParaRPr lang="en-US" dirty="0" smtClean="0"/>
+          </a:p>
+          <a:p>
+            <a:r>
+              <a:rPr lang="en-US" dirty="0" smtClean="0"/>
+              <a:t>What are governments doing about it?</a:t>
+            </a:r>
+          </a:p>
+          <a:p>
+            <a:pPr lvl="1"/>
+            <a:r>
+              <a:rPr lang="en-US" dirty="0" smtClean="0"/>
+              <a:t>Taxation rules in India?</a:t>
+            </a:r>
+          </a:p>
+          <a:p>
+            <a:pPr lvl="1"/>
+            <a:r>
+              <a:rPr lang="en-US" dirty="0" smtClean="0"/>
+              <a:t>ICO regulations?</a:t>
+            </a:r>
+          </a:p>
+          <a:p>
+            <a:r>
+              <a:rPr lang="en-US" dirty="0" smtClean="0"/>
+              <a:t>What are DAOs (Decentralized Autonomous Organizations)</a:t>
+            </a:r>
+            <a:r>
+              <a:rPr lang="en-US" dirty="0" smtClean="0"/>
+              <a:t>?</a:t>
+            </a:r>
+          </a:p>
+          <a:p>
+            <a:r>
+              <a:rPr lang="en-US" dirty="0" smtClean="0"/>
+              <a:t>What are DAPPS </a:t>
+            </a:r>
+            <a:r>
+              <a:rPr lang="en-US" smtClean="0"/>
+              <a:t>(Decentralized APPS)?</a:t>
+            </a:r>
+            <a:endParaRPr lang="en-US" dirty="0" smtClean="0"/>
+          </a:p>
+          <a:p>
+            <a:r>
+              <a:rPr lang="en-US" dirty="0" smtClean="0"/>
+              <a:t>Was there a fraud in such systems?</a:t>
+            </a:r>
+          </a:p>
+          <a:p>
+            <a:pPr lvl="1"/>
+            <a:r>
+              <a:rPr lang="en-US" dirty="0" smtClean="0"/>
+              <a:t>What steps were taken for recovery?</a:t>
+            </a:r>
+          </a:p>
+          <a:p>
+            <a:pPr lvl="1"/>
+            <a:r>
+              <a:rPr lang="en-US" dirty="0" smtClean="0"/>
+              <a:t>50mn DAO virtual currency siphoned </a:t>
+            </a:r>
+            <a:r>
+              <a:rPr lang="en-US" dirty="0" smtClean="0"/>
+              <a:t>off</a:t>
+            </a:r>
+            <a:endParaRPr lang="en-US" dirty="0"/>
+          </a:p>
+        </p:txBody>
+      </p:sp>
+    </p:spTree>
+    <p:extLst>
+      <p:ext uri="{BB962C8B-B14F-4D97-AF65-F5344CB8AC3E}">
+        <p14:creationId xmlns:p14="http://schemas.microsoft.com/office/powerpoint/2010/main" val="3915952101"/>
+      </p:ext>
+    </p:extLst>
+  </p:cSld>
+  <p:clrMapOvr>
+    <a:masterClrMapping/>
+  </p:clrMapOvr>
+  <p:timing>
+    <p:tnLst>
+      <p:par>
+        <p:cTn xmlns:p14="http://schemas.microsoft.com/office/powerpoint/2010/main" id="1" dur="indefinite" restart="never" nodeType="tmRoot"/>
+      </p:par>
+    </p:tnLst>
+  </p:timing>
+</p:sld>
+</file>
+
+<file path=ppt/slides/slide36.xml><?xml version="1.0" encoding="utf-8"?>
 <p:sld xmlns:a="http://schemas.openxmlformats.org/drawingml/2006/main" xmlns:r="http://schemas.openxmlformats.org/officeDocument/2006/relationships" xmlns:p="http://schemas.openxmlformats.org/presentationml/2006/main">
   <p:cSld>
     <p:spTree>

</xml_diff>